<commit_message>
Small corrections to report.
</commit_message>
<xml_diff>
--- a/VLSI presentation Gossel Dial Krehlik.pptx
+++ b/VLSI presentation Gossel Dial Krehlik.pptx
@@ -5,7 +5,7 @@
     <p:sldMasterId id="2147483660" r:id="rId1"/>
   </p:sldMasterIdLst>
   <p:notesMasterIdLst>
-    <p:notesMasterId r:id="rId19"/>
+    <p:notesMasterId r:id="rId20"/>
   </p:notesMasterIdLst>
   <p:sldIdLst>
     <p:sldId id="256" r:id="rId2"/>
@@ -21,10 +21,11 @@
     <p:sldId id="296" r:id="rId12"/>
     <p:sldId id="304" r:id="rId13"/>
     <p:sldId id="303" r:id="rId14"/>
-    <p:sldId id="295" r:id="rId15"/>
-    <p:sldId id="282" r:id="rId16"/>
-    <p:sldId id="302" r:id="rId17"/>
-    <p:sldId id="283" r:id="rId18"/>
+    <p:sldId id="309" r:id="rId15"/>
+    <p:sldId id="295" r:id="rId16"/>
+    <p:sldId id="282" r:id="rId17"/>
+    <p:sldId id="302" r:id="rId18"/>
+    <p:sldId id="283" r:id="rId19"/>
   </p:sldIdLst>
   <p:sldSz cx="9144000" cy="6858000" type="screen4x3"/>
   <p:notesSz cx="6858000" cy="9144000"/>
@@ -2970,6 +2971,159 @@
             <p:ph sz="half" idx="1"/>
           </p:nvPr>
         </p:nvSpPr>
+        <p:spPr>
+          <a:xfrm>
+            <a:off x="457200" y="1600199"/>
+            <a:ext cx="8229600" cy="4523260"/>
+          </a:xfrm>
+        </p:spPr>
+        <p:txBody>
+          <a:bodyPr>
+            <a:normAutofit lnSpcReduction="10000"/>
+          </a:bodyPr>
+          <a:lstStyle/>
+          <a:p>
+            <a:r>
+              <a:rPr lang="en-US" dirty="0" smtClean="0"/>
+              <a:t>UC Berkley for developing Magic and Spice</a:t>
+            </a:r>
+          </a:p>
+          <a:p>
+            <a:r>
+              <a:rPr lang="en-US" dirty="0" smtClean="0"/>
+              <a:t>Linus Torvalds for the Linux Kernel</a:t>
+            </a:r>
+          </a:p>
+          <a:p>
+            <a:r>
+              <a:rPr lang="en-US" dirty="0" smtClean="0"/>
+              <a:t>Microsoft for C#</a:t>
+            </a:r>
+          </a:p>
+          <a:p>
+            <a:r>
+              <a:rPr lang="en-US" dirty="0" err="1" smtClean="0"/>
+              <a:t>MathWorks</a:t>
+            </a:r>
+            <a:r>
+              <a:rPr lang="en-US" dirty="0" smtClean="0"/>
+              <a:t> for MATLAB</a:t>
+            </a:r>
+          </a:p>
+          <a:p>
+            <a:r>
+              <a:rPr lang="en-US" dirty="0" smtClean="0"/>
+              <a:t>Dana Thomas and James Johnson</a:t>
+            </a:r>
+          </a:p>
+          <a:p>
+            <a:r>
+              <a:rPr lang="en-US" dirty="0" smtClean="0"/>
+              <a:t>Doug Goering</a:t>
+            </a:r>
+          </a:p>
+          <a:p>
+            <a:r>
+              <a:rPr lang="en-US" dirty="0" smtClean="0"/>
+              <a:t>Ross Nelson</a:t>
+            </a:r>
+          </a:p>
+          <a:p>
+            <a:r>
+              <a:rPr lang="en-US" dirty="0" smtClean="0"/>
+              <a:t>Logan Graves</a:t>
+            </a:r>
+          </a:p>
+          <a:p>
+            <a:r>
+              <a:rPr lang="en-US" dirty="0" smtClean="0"/>
+              <a:t>Brandon </a:t>
+            </a:r>
+            <a:r>
+              <a:rPr lang="en-US" dirty="0" err="1"/>
+              <a:t>B</a:t>
+            </a:r>
+            <a:r>
+              <a:rPr lang="en-US" dirty="0" err="1" smtClean="0"/>
+              <a:t>urgett</a:t>
+            </a:r>
+            <a:endParaRPr lang="en-US" dirty="0" smtClean="0"/>
+          </a:p>
+          <a:p>
+            <a:endParaRPr lang="en-US" dirty="0" smtClean="0"/>
+          </a:p>
+        </p:txBody>
+      </p:sp>
+    </p:spTree>
+    <p:extLst>
+      <p:ext uri="{BB962C8B-B14F-4D97-AF65-F5344CB8AC3E}">
+        <p14:creationId xmlns:p14="http://schemas.microsoft.com/office/powerpoint/2010/main" val="476768779"/>
+      </p:ext>
+    </p:extLst>
+  </p:cSld>
+  <p:clrMapOvr>
+    <a:masterClrMapping/>
+  </p:clrMapOvr>
+  <p:timing>
+    <p:tnLst>
+      <p:par>
+        <p:cTn id="1" dur="indefinite" restart="never" nodeType="tmRoot"/>
+      </p:par>
+    </p:tnLst>
+  </p:timing>
+</p:sld>
+</file>
+
+<file path=ppt/slides/slide15.xml><?xml version="1.0" encoding="utf-8"?>
+<p:sld xmlns:a="http://schemas.openxmlformats.org/drawingml/2006/main" xmlns:r="http://schemas.openxmlformats.org/officeDocument/2006/relationships" xmlns:p="http://schemas.openxmlformats.org/presentationml/2006/main">
+  <p:cSld>
+    <p:spTree>
+      <p:nvGrpSpPr>
+        <p:cNvPr id="1" name=""/>
+        <p:cNvGrpSpPr/>
+        <p:nvPr/>
+      </p:nvGrpSpPr>
+      <p:grpSpPr>
+        <a:xfrm>
+          <a:off x="0" y="0"/>
+          <a:ext cx="0" cy="0"/>
+          <a:chOff x="0" y="0"/>
+          <a:chExt cx="0" cy="0"/>
+        </a:xfrm>
+      </p:grpSpPr>
+      <p:sp>
+        <p:nvSpPr>
+          <p:cNvPr id="4" name="Title 3"/>
+          <p:cNvSpPr>
+            <a:spLocks noGrp="1"/>
+          </p:cNvSpPr>
+          <p:nvPr>
+            <p:ph type="title"/>
+          </p:nvPr>
+        </p:nvSpPr>
+        <p:spPr/>
+        <p:txBody>
+          <a:bodyPr/>
+          <a:lstStyle/>
+          <a:p>
+            <a:r>
+              <a:rPr lang="en-US" dirty="0" smtClean="0"/>
+              <a:t>Acknowledgements</a:t>
+            </a:r>
+            <a:endParaRPr lang="en-US" dirty="0"/>
+          </a:p>
+        </p:txBody>
+      </p:sp>
+      <p:sp>
+        <p:nvSpPr>
+          <p:cNvPr id="5" name="Content Placeholder 4"/>
+          <p:cNvSpPr>
+            <a:spLocks noGrp="1"/>
+          </p:cNvSpPr>
+          <p:nvPr>
+            <p:ph sz="half" idx="1"/>
+          </p:nvPr>
+        </p:nvSpPr>
         <p:spPr/>
         <p:txBody>
           <a:bodyPr/>
@@ -3005,7 +3159,7 @@
         </p:blipFill>
         <p:spPr bwMode="auto">
           <a:xfrm>
-            <a:off x="5459094" y="1533359"/>
+            <a:off x="5501626" y="1469561"/>
             <a:ext cx="3060066" cy="4590100"/>
           </a:xfrm>
           <a:prstGeom prst="rect">
@@ -3043,7 +3197,7 @@
 </p:sld>
 </file>
 
-<file path=ppt/slides/slide15.xml><?xml version="1.0" encoding="utf-8"?>
+<file path=ppt/slides/slide16.xml><?xml version="1.0" encoding="utf-8"?>
 <p:sld xmlns:a="http://schemas.openxmlformats.org/drawingml/2006/main" xmlns:r="http://schemas.openxmlformats.org/officeDocument/2006/relationships" xmlns:p="http://schemas.openxmlformats.org/presentationml/2006/main">
   <p:cSld>
     <p:bg>
@@ -3099,7 +3253,7 @@
 </p:sld>
 </file>
 
-<file path=ppt/slides/slide16.xml><?xml version="1.0" encoding="utf-8"?>
+<file path=ppt/slides/slide17.xml><?xml version="1.0" encoding="utf-8"?>
 <p:sld xmlns:a="http://schemas.openxmlformats.org/drawingml/2006/main" xmlns:r="http://schemas.openxmlformats.org/officeDocument/2006/relationships" xmlns:p="http://schemas.openxmlformats.org/presentationml/2006/main">
   <p:cSld>
     <p:spTree>
@@ -3194,7 +3348,7 @@
 </p:sld>
 </file>
 
-<file path=ppt/slides/slide17.xml><?xml version="1.0" encoding="utf-8"?>
+<file path=ppt/slides/slide18.xml><?xml version="1.0" encoding="utf-8"?>
 <p:sld xmlns:a="http://schemas.openxmlformats.org/drawingml/2006/main" xmlns:r="http://schemas.openxmlformats.org/officeDocument/2006/relationships" xmlns:p="http://schemas.openxmlformats.org/presentationml/2006/main">
   <p:cSld>
     <p:spTree>

</xml_diff>